<commit_message>
Update files & Add user journey map docs
</commit_message>
<xml_diff>
--- a/02-ux-design-process/Week2/User-journey-map-activity/User-Journey-Map-CoffeeHouse1.pptx
+++ b/02-ux-design-process/Week2/User-journey-map-activity/User-Journey-Map-CoffeeHouse1.pptx
@@ -44,7 +44,7 @@
         <p:txBody>
           <a:bodyPr/>
           <a:p>
-            <a:fld id="{DCFFBA55-7D7A-4EA3-B257-0F9E5F8E8281}" type="slidenum">
+            <a:fld id="{991FAB4E-8626-47AE-8590-E328351E0171}" type="slidenum">
               <a:t>&lt;#&gt;</a:t>
             </a:fld>
           </a:p>
@@ -212,7 +212,7 @@
         <p:txBody>
           <a:bodyPr/>
           <a:p>
-            <a:fld id="{63B8392D-D8BE-4F89-9C07-50EF9B478FEF}" type="slidenum">
+            <a:fld id="{68BA1F8C-14DB-4851-8FAE-75483B5AD945}" type="slidenum">
               <a:t>&lt;#&gt;</a:t>
             </a:fld>
           </a:p>
@@ -466,7 +466,7 @@
         <p:txBody>
           <a:bodyPr/>
           <a:p>
-            <a:fld id="{F318C335-9D3E-437E-9E9D-1AD1FB3E6FDA}" type="slidenum">
+            <a:fld id="{FF718A5F-7F18-46C2-99B8-2B50BB5A68A4}" type="slidenum">
               <a:t>&lt;#&gt;</a:t>
             </a:fld>
           </a:p>
@@ -806,7 +806,7 @@
         <p:txBody>
           <a:bodyPr/>
           <a:p>
-            <a:fld id="{72F7EC78-68C3-4B94-8CFA-4F511A7A51C6}" type="slidenum">
+            <a:fld id="{0099D473-32D9-4C07-B019-D341A8AE4649}" type="slidenum">
               <a:t>&lt;#&gt;</a:t>
             </a:fld>
           </a:p>
@@ -928,7 +928,7 @@
         <p:txBody>
           <a:bodyPr/>
           <a:p>
-            <a:fld id="{D79054A2-1751-4297-AC72-387D6CA02FA9}" type="slidenum">
+            <a:fld id="{FE632490-3738-46A9-85F5-381976CFFDCC}" type="slidenum">
               <a:t>&lt;#&gt;</a:t>
             </a:fld>
           </a:p>
@@ -1053,7 +1053,7 @@
         <p:txBody>
           <a:bodyPr/>
           <a:p>
-            <a:fld id="{C989FBCD-CCF0-4D50-9027-1A924A921885}" type="slidenum">
+            <a:fld id="{E99110C3-8D87-44FC-B444-CA9428FA68BB}" type="slidenum">
               <a:t>&lt;#&gt;</a:t>
             </a:fld>
           </a:p>
@@ -1221,7 +1221,7 @@
         <p:txBody>
           <a:bodyPr/>
           <a:p>
-            <a:fld id="{750CF59F-7BAD-41F9-9B65-D9C0B217230F}" type="slidenum">
+            <a:fld id="{18ACB96A-8740-41CD-867D-32A5610CC09E}" type="slidenum">
               <a:t>&lt;#&gt;</a:t>
             </a:fld>
           </a:p>
@@ -1303,7 +1303,7 @@
         <p:txBody>
           <a:bodyPr/>
           <a:p>
-            <a:fld id="{ADA846D1-1ED9-42F0-8B57-CDAE178A748A}" type="slidenum">
+            <a:fld id="{BAA36FA9-5FC8-4F5B-9019-9350BBFF976C}" type="slidenum">
               <a:t>&lt;#&gt;</a:t>
             </a:fld>
           </a:p>
@@ -1383,7 +1383,7 @@
         <p:txBody>
           <a:bodyPr/>
           <a:p>
-            <a:fld id="{5EFF01F7-A15F-4DA7-9FF4-1F2915947EEF}" type="slidenum">
+            <a:fld id="{32628103-D464-44DB-8AF6-58D13B9F3D61}" type="slidenum">
               <a:t>&lt;#&gt;</a:t>
             </a:fld>
           </a:p>
@@ -1594,7 +1594,7 @@
         <p:txBody>
           <a:bodyPr/>
           <a:p>
-            <a:fld id="{63F5566A-120D-494A-8035-F3AF940F4016}" type="slidenum">
+            <a:fld id="{EFF4085B-264F-4E41-8611-2F4A493ABD4E}" type="slidenum">
               <a:t>&lt;#&gt;</a:t>
             </a:fld>
           </a:p>
@@ -1805,7 +1805,7 @@
         <p:txBody>
           <a:bodyPr/>
           <a:p>
-            <a:fld id="{02178C59-ECD4-4EF5-AB32-A4BA1B06A0CC}" type="slidenum">
+            <a:fld id="{8FDADF70-C518-439F-8D41-80DCE1601B21}" type="slidenum">
               <a:t>&lt;#&gt;</a:t>
             </a:fld>
           </a:p>
@@ -2016,7 +2016,7 @@
         <p:txBody>
           <a:bodyPr/>
           <a:p>
-            <a:fld id="{A9B9DE91-71DC-4E43-AA28-68566F630F4B}" type="slidenum">
+            <a:fld id="{74C55A02-58F3-483D-814C-257A43143086}" type="slidenum">
               <a:t>&lt;#&gt;</a:t>
             </a:fld>
           </a:p>
@@ -2106,7 +2106,7 @@
                 <a:tab algn="l" pos="0"/>
               </a:tabLst>
             </a:pPr>
-            <a:fld id="{A55A2450-1ADC-4410-9D05-930C74980A1A}" type="slidenum">
+            <a:fld id="{A3ADF172-CE96-4940-82A1-82DF94431E34}" type="slidenum">
               <a:rPr b="0" lang="en" sz="1000" spc="-1" strike="noStrike">
                 <a:solidFill>
                   <a:schemeClr val="dk2"/>

</xml_diff>